<commit_message>
Bugs & Fixes (#34)
</commit_message>
<xml_diff>
--- a/MPPT Presentation.pptx
+++ b/MPPT Presentation.pptx
@@ -224,7 +224,7 @@
           <a:p>
             <a:fld id="{AFD01546-198A-4195-BCF8-F0FF54C90E5E}" type="datetimeFigureOut">
               <a:rPr lang="en-US" smtClean="0"/>
-              <a:t>5/19/2023</a:t>
+              <a:t>5/26/2023</a:t>
             </a:fld>
             <a:endParaRPr lang="en-US" dirty="0"/>
           </a:p>
@@ -1828,7 +1828,7 @@
           <a:p>
             <a:fld id="{88D38747-4367-4BD2-8D51-C97E202738E2}" type="datetime1">
               <a:rPr lang="en-US" smtClean="0"/>
-              <a:t>5/19/2023</a:t>
+              <a:t>5/26/2023</a:t>
             </a:fld>
             <a:endParaRPr lang="en-US" dirty="0"/>
           </a:p>
@@ -2133,7 +2133,7 @@
           <a:p>
             <a:fld id="{11F1B079-7EF0-44EE-B798-BCC497C9F3B2}" type="datetime1">
               <a:rPr lang="en-US" smtClean="0"/>
-              <a:t>5/19/2023</a:t>
+              <a:t>5/26/2023</a:t>
             </a:fld>
             <a:endParaRPr lang="en-US" dirty="0"/>
           </a:p>
@@ -2327,7 +2327,7 @@
           <a:p>
             <a:fld id="{28FF70A8-1D13-4657-95F0-A9EA54967B8D}" type="datetime1">
               <a:rPr lang="en-US" smtClean="0"/>
-              <a:t>5/19/2023</a:t>
+              <a:t>5/26/2023</a:t>
             </a:fld>
             <a:endParaRPr lang="en-US" dirty="0"/>
           </a:p>
@@ -2590,7 +2590,7 @@
           <a:p>
             <a:fld id="{21EB90AC-71BD-4C7F-8ACA-7B3F18292E63}" type="datetime1">
               <a:rPr lang="en-US" smtClean="0"/>
-              <a:t>5/19/2023</a:t>
+              <a:t>5/26/2023</a:t>
             </a:fld>
             <a:endParaRPr lang="en-US" dirty="0"/>
           </a:p>
@@ -3026,7 +3026,7 @@
           <a:p>
             <a:fld id="{4E6EFC2C-8905-46F0-B443-CE905B76BA01}" type="datetime1">
               <a:rPr lang="en-US" smtClean="0"/>
-              <a:t>5/19/2023</a:t>
+              <a:t>5/26/2023</a:t>
             </a:fld>
             <a:endParaRPr lang="en-US" dirty="0"/>
           </a:p>
@@ -3563,7 +3563,7 @@
           <a:p>
             <a:fld id="{D9079DC3-C9B5-499E-9140-0DC28B7074E2}" type="datetime1">
               <a:rPr lang="en-US" smtClean="0"/>
-              <a:t>5/19/2023</a:t>
+              <a:t>5/26/2023</a:t>
             </a:fld>
             <a:endParaRPr lang="en-US" dirty="0"/>
           </a:p>
@@ -4445,7 +4445,7 @@
           <a:p>
             <a:fld id="{30BB33EA-E472-4D22-9C03-A9C14AA21CED}" type="datetime1">
               <a:rPr lang="en-US" smtClean="0"/>
-              <a:t>5/19/2023</a:t>
+              <a:t>5/26/2023</a:t>
             </a:fld>
             <a:endParaRPr lang="en-US" dirty="0"/>
           </a:p>
@@ -4615,7 +4615,7 @@
           <a:p>
             <a:fld id="{73C55A3C-5767-4844-A0A3-83778C2E5409}" type="datetime1">
               <a:rPr lang="en-US" smtClean="0"/>
-              <a:t>5/19/2023</a:t>
+              <a:t>5/26/2023</a:t>
             </a:fld>
             <a:endParaRPr lang="en-US" dirty="0"/>
           </a:p>
@@ -4859,7 +4859,7 @@
           <a:p>
             <a:fld id="{CAE507A8-A5CF-4D38-AB86-7EDDA87A85D4}" type="datetime1">
               <a:rPr lang="en-US" smtClean="0"/>
-              <a:t>5/19/2023</a:t>
+              <a:t>5/26/2023</a:t>
             </a:fld>
             <a:endParaRPr lang="en-US" dirty="0"/>
           </a:p>
@@ -5101,7 +5101,7 @@
           <a:p>
             <a:fld id="{BDFCD27C-8599-43EF-BA1D-14DDC1946E06}" type="datetime1">
               <a:rPr lang="en-US" smtClean="0"/>
-              <a:t>5/19/2023</a:t>
+              <a:t>5/26/2023</a:t>
             </a:fld>
             <a:endParaRPr lang="en-US" dirty="0"/>
           </a:p>
@@ -5584,7 +5584,7 @@
           <a:p>
             <a:fld id="{49343D99-809A-49C0-96E5-4250D0B498EE}" type="datetime1">
               <a:rPr lang="en-US" smtClean="0"/>
-              <a:t>5/19/2023</a:t>
+              <a:t>5/26/2023</a:t>
             </a:fld>
             <a:endParaRPr lang="en-US" dirty="0"/>
           </a:p>
@@ -5702,7 +5702,7 @@
           <a:p>
             <a:fld id="{A143DE9B-B678-4EFB-BB7D-A4370204A0B0}" type="datetime1">
               <a:rPr lang="en-US" smtClean="0"/>
-              <a:t>5/19/2023</a:t>
+              <a:t>5/26/2023</a:t>
             </a:fld>
             <a:endParaRPr lang="en-US" dirty="0"/>
           </a:p>
@@ -5797,7 +5797,7 @@
           <a:p>
             <a:fld id="{E68812DA-F765-4142-A6A3-A8ED7235E082}" type="datetime1">
               <a:rPr lang="en-US" smtClean="0"/>
-              <a:t>5/19/2023</a:t>
+              <a:t>5/26/2023</a:t>
             </a:fld>
             <a:endParaRPr lang="en-US" dirty="0"/>
           </a:p>
@@ -6052,7 +6052,7 @@
           <a:p>
             <a:fld id="{3E0277FD-7DE6-41D4-930D-AC99F5AFE54E}" type="datetime1">
               <a:rPr lang="en-US" smtClean="0"/>
-              <a:t>5/19/2023</a:t>
+              <a:t>5/26/2023</a:t>
             </a:fld>
             <a:endParaRPr lang="en-US" dirty="0"/>
           </a:p>
@@ -6359,7 +6359,7 @@
           <a:p>
             <a:fld id="{9EA15526-7079-4B7B-987C-1B5FAE11A0FF}" type="datetime1">
               <a:rPr lang="en-US" smtClean="0"/>
-              <a:t>5/19/2023</a:t>
+              <a:t>5/26/2023</a:t>
             </a:fld>
             <a:endParaRPr lang="en-US" dirty="0"/>
           </a:p>
@@ -6594,7 +6594,7 @@
           <a:p>
             <a:fld id="{073ED0CC-082F-4160-86E5-0D6041F12778}" type="datetime1">
               <a:rPr lang="en-US" smtClean="0"/>
-              <a:t>5/19/2023</a:t>
+              <a:t>5/26/2023</a:t>
             </a:fld>
             <a:endParaRPr lang="en-US" dirty="0"/>
           </a:p>
@@ -7634,16 +7634,6 @@
           <a:lstStyle/>
           <a:p>
             <a:r>
-              <a:rPr lang="en-IN" dirty="0" err="1">
-                <a:solidFill>
-                  <a:schemeClr val="bg1"/>
-                </a:solidFill>
-                <a:latin typeface="Times New Roman" panose="02020603050405020304" pitchFamily="18" charset="0"/>
-                <a:cs typeface="Times New Roman" panose="02020603050405020304" pitchFamily="18" charset="0"/>
-              </a:rPr>
-              <a:t>Advait</a:t>
-            </a:r>
-            <a:r>
               <a:rPr lang="en-IN" dirty="0">
                 <a:solidFill>
                   <a:schemeClr val="bg1"/>
@@ -7651,27 +7641,7 @@
                 <a:latin typeface="Times New Roman" panose="02020603050405020304" pitchFamily="18" charset="0"/>
                 <a:cs typeface="Times New Roman" panose="02020603050405020304" pitchFamily="18" charset="0"/>
               </a:rPr>
-              <a:t> </a:t>
-            </a:r>
-            <a:r>
-              <a:rPr lang="en-IN" dirty="0" err="1">
-                <a:solidFill>
-                  <a:schemeClr val="bg1"/>
-                </a:solidFill>
-                <a:latin typeface="Times New Roman" panose="02020603050405020304" pitchFamily="18" charset="0"/>
-                <a:cs typeface="Times New Roman" panose="02020603050405020304" pitchFamily="18" charset="0"/>
-              </a:rPr>
-              <a:t>Thale</a:t>
-            </a:r>
-            <a:r>
-              <a:rPr lang="en-IN" dirty="0">
-                <a:solidFill>
-                  <a:schemeClr val="bg1"/>
-                </a:solidFill>
-                <a:latin typeface="Times New Roman" panose="02020603050405020304" pitchFamily="18" charset="0"/>
-                <a:cs typeface="Times New Roman" panose="02020603050405020304" pitchFamily="18" charset="0"/>
-              </a:rPr>
-              <a:t>  </a:t>
+              <a:t>Advait Thale  </a:t>
             </a:r>
             <a:r>
               <a:rPr lang="en-IN" sz="1800" b="1" i="0" u="none" strike="noStrike" dirty="0">
@@ -13308,6 +13278,15 @@
 </file>
 
 <file path=customXml/item2.xml><?xml version="1.0" encoding="utf-8"?>
+<?mso-contentType ?>
+<FormTemplates xmlns="http://schemas.microsoft.com/sharepoint/v3/contenttype/forms">
+  <Display>DocumentLibraryForm</Display>
+  <Edit>DocumentLibraryForm</Edit>
+  <New>DocumentLibraryForm</New>
+</FormTemplates>
+</file>
+
+<file path=customXml/item3.xml><?xml version="1.0" encoding="utf-8"?>
 <ct:contentTypeSchema xmlns:ct="http://schemas.microsoft.com/office/2006/metadata/contentType" xmlns:ma="http://schemas.microsoft.com/office/2006/metadata/properties/metaAttributes" ct:_="" ma:_="" ma:contentTypeName="Document" ma:contentTypeID="0x01010079F111ED35F8CC479449609E8A0923A6" ma:contentTypeVersion="12" ma:contentTypeDescription="Create a new document." ma:contentTypeScope="" ma:versionID="a410dd7f93c95333ffa1b60ed6adedd1">
   <xsd:schema xmlns:xsd="http://www.w3.org/2001/XMLSchema" xmlns:xs="http://www.w3.org/2001/XMLSchema" xmlns:p="http://schemas.microsoft.com/office/2006/metadata/properties" xmlns:ns2="71af3243-3dd4-4a8d-8c0d-dd76da1f02a5" xmlns:ns3="16c05727-aa75-4e4a-9b5f-8a80a1165891" targetNamespace="http://schemas.microsoft.com/office/2006/metadata/properties" ma:root="true" ma:fieldsID="a936d9baba76aa3866493feff160faab" ns2:_="" ns3:_="">
     <xsd:import namespace="71af3243-3dd4-4a8d-8c0d-dd76da1f02a5"/>
@@ -13528,15 +13507,6 @@
 </ct:contentTypeSchema>
 </file>
 
-<file path=customXml/item3.xml><?xml version="1.0" encoding="utf-8"?>
-<?mso-contentType ?>
-<FormTemplates xmlns="http://schemas.microsoft.com/sharepoint/v3/contenttype/forms">
-  <Display>DocumentLibraryForm</Display>
-  <Edit>DocumentLibraryForm</Edit>
-  <New>DocumentLibraryForm</New>
-</FormTemplates>
-</file>
-
 <file path=customXml/itemProps1.xml><?xml version="1.0" encoding="utf-8"?>
 <ds:datastoreItem xmlns:ds="http://schemas.openxmlformats.org/officeDocument/2006/customXml" ds:itemID="{2C4C00F4-06E9-43E3-AD97-88A857CEFA82}">
   <ds:schemaRefs>
@@ -13548,6 +13518,14 @@
 </file>
 
 <file path=customXml/itemProps2.xml><?xml version="1.0" encoding="utf-8"?>
+<ds:datastoreItem xmlns:ds="http://schemas.openxmlformats.org/officeDocument/2006/customXml" ds:itemID="{64B270AB-C138-415C-897E-3C24487DECF1}">
+  <ds:schemaRefs>
+    <ds:schemaRef ds:uri="http://schemas.microsoft.com/sharepoint/v3/contenttype/forms"/>
+  </ds:schemaRefs>
+</ds:datastoreItem>
+</file>
+
+<file path=customXml/itemProps3.xml><?xml version="1.0" encoding="utf-8"?>
 <ds:datastoreItem xmlns:ds="http://schemas.openxmlformats.org/officeDocument/2006/customXml" ds:itemID="{0585E981-8C91-4205-A0C3-C991F42B4C9E}">
   <ds:schemaRefs>
     <ds:schemaRef ds:uri="http://schemas.microsoft.com/office/2006/metadata/contentType"/>
@@ -13564,12 +13542,4 @@
     <ds:schemaRef ds:uri="http://schemas.microsoft.com/internal/obd"/>
   </ds:schemaRefs>
 </ds:datastoreItem>
-</file>
-
-<file path=customXml/itemProps3.xml><?xml version="1.0" encoding="utf-8"?>
-<ds:datastoreItem xmlns:ds="http://schemas.openxmlformats.org/officeDocument/2006/customXml" ds:itemID="{64B270AB-C138-415C-897E-3C24487DECF1}">
-  <ds:schemaRefs>
-    <ds:schemaRef ds:uri="http://schemas.microsoft.com/sharepoint/v3/contenttype/forms"/>
-  </ds:schemaRefs>
-</ds:datastoreItem>
 </file>
</xml_diff>